<commit_message>
Preperation for Final Report
Cleaned up figures
</commit_message>
<xml_diff>
--- a/Figures/Fall2019/RBMfigure.pptx
+++ b/Figures/Fall2019/RBMfigure.pptx
@@ -263,7 +263,7 @@
           <a:p>
             <a:fld id="{512C11B2-92EB-42FC-99BC-4AAF8E534B76}" type="datetimeFigureOut">
               <a:rPr lang="en-CA" smtClean="0"/>
-              <a:t>2020-02-22</a:t>
+              <a:t>2020-04-11</a:t>
             </a:fld>
             <a:endParaRPr lang="en-CA"/>
           </a:p>
@@ -463,7 +463,7 @@
           <a:p>
             <a:fld id="{512C11B2-92EB-42FC-99BC-4AAF8E534B76}" type="datetimeFigureOut">
               <a:rPr lang="en-CA" smtClean="0"/>
-              <a:t>2020-02-22</a:t>
+              <a:t>2020-04-11</a:t>
             </a:fld>
             <a:endParaRPr lang="en-CA"/>
           </a:p>
@@ -673,7 +673,7 @@
           <a:p>
             <a:fld id="{512C11B2-92EB-42FC-99BC-4AAF8E534B76}" type="datetimeFigureOut">
               <a:rPr lang="en-CA" smtClean="0"/>
-              <a:t>2020-02-22</a:t>
+              <a:t>2020-04-11</a:t>
             </a:fld>
             <a:endParaRPr lang="en-CA"/>
           </a:p>
@@ -873,7 +873,7 @@
           <a:p>
             <a:fld id="{512C11B2-92EB-42FC-99BC-4AAF8E534B76}" type="datetimeFigureOut">
               <a:rPr lang="en-CA" smtClean="0"/>
-              <a:t>2020-02-22</a:t>
+              <a:t>2020-04-11</a:t>
             </a:fld>
             <a:endParaRPr lang="en-CA"/>
           </a:p>
@@ -1149,7 +1149,7 @@
           <a:p>
             <a:fld id="{512C11B2-92EB-42FC-99BC-4AAF8E534B76}" type="datetimeFigureOut">
               <a:rPr lang="en-CA" smtClean="0"/>
-              <a:t>2020-02-22</a:t>
+              <a:t>2020-04-11</a:t>
             </a:fld>
             <a:endParaRPr lang="en-CA"/>
           </a:p>
@@ -1417,7 +1417,7 @@
           <a:p>
             <a:fld id="{512C11B2-92EB-42FC-99BC-4AAF8E534B76}" type="datetimeFigureOut">
               <a:rPr lang="en-CA" smtClean="0"/>
-              <a:t>2020-02-22</a:t>
+              <a:t>2020-04-11</a:t>
             </a:fld>
             <a:endParaRPr lang="en-CA"/>
           </a:p>
@@ -1832,7 +1832,7 @@
           <a:p>
             <a:fld id="{512C11B2-92EB-42FC-99BC-4AAF8E534B76}" type="datetimeFigureOut">
               <a:rPr lang="en-CA" smtClean="0"/>
-              <a:t>2020-02-22</a:t>
+              <a:t>2020-04-11</a:t>
             </a:fld>
             <a:endParaRPr lang="en-CA"/>
           </a:p>
@@ -1974,7 +1974,7 @@
           <a:p>
             <a:fld id="{512C11B2-92EB-42FC-99BC-4AAF8E534B76}" type="datetimeFigureOut">
               <a:rPr lang="en-CA" smtClean="0"/>
-              <a:t>2020-02-22</a:t>
+              <a:t>2020-04-11</a:t>
             </a:fld>
             <a:endParaRPr lang="en-CA"/>
           </a:p>
@@ -2087,7 +2087,7 @@
           <a:p>
             <a:fld id="{512C11B2-92EB-42FC-99BC-4AAF8E534B76}" type="datetimeFigureOut">
               <a:rPr lang="en-CA" smtClean="0"/>
-              <a:t>2020-02-22</a:t>
+              <a:t>2020-04-11</a:t>
             </a:fld>
             <a:endParaRPr lang="en-CA"/>
           </a:p>
@@ -2400,7 +2400,7 @@
           <a:p>
             <a:fld id="{512C11B2-92EB-42FC-99BC-4AAF8E534B76}" type="datetimeFigureOut">
               <a:rPr lang="en-CA" smtClean="0"/>
-              <a:t>2020-02-22</a:t>
+              <a:t>2020-04-11</a:t>
             </a:fld>
             <a:endParaRPr lang="en-CA"/>
           </a:p>
@@ -2689,7 +2689,7 @@
           <a:p>
             <a:fld id="{512C11B2-92EB-42FC-99BC-4AAF8E534B76}" type="datetimeFigureOut">
               <a:rPr lang="en-CA" smtClean="0"/>
-              <a:t>2020-02-22</a:t>
+              <a:t>2020-04-11</a:t>
             </a:fld>
             <a:endParaRPr lang="en-CA"/>
           </a:p>
@@ -2932,7 +2932,7 @@
           <a:p>
             <a:fld id="{512C11B2-92EB-42FC-99BC-4AAF8E534B76}" type="datetimeFigureOut">
               <a:rPr lang="en-CA" smtClean="0"/>
-              <a:t>2020-02-22</a:t>
+              <a:t>2020-04-11</a:t>
             </a:fld>
             <a:endParaRPr lang="en-CA"/>
           </a:p>
@@ -4187,8 +4187,8 @@
           </a:p>
         </p:txBody>
       </p:sp>
-      <mc:AlternateContent xmlns:mc="http://schemas.openxmlformats.org/markup-compatibility/2006" xmlns:a14="http://schemas.microsoft.com/office/drawing/2010/main">
-        <mc:Choice Requires="a14">
+      <mc:AlternateContent xmlns:mc="http://schemas.openxmlformats.org/markup-compatibility/2006">
+        <mc:Choice xmlns:a14="http://schemas.microsoft.com/office/drawing/2010/main" Requires="a14">
           <p:sp>
             <p:nvSpPr>
               <p:cNvPr id="11" name="TextBox 10">
@@ -4204,7 +4204,174 @@
             <p:spPr>
               <a:xfrm>
                 <a:off x="3468466" y="2225335"/>
-                <a:ext cx="310661" cy="276999"/>
+                <a:ext cx="310662" cy="276999"/>
+              </a:xfrm>
+              <a:prstGeom prst="rect">
+                <a:avLst/>
+              </a:prstGeom>
+              <a:noFill/>
+            </p:spPr>
+            <p:txBody>
+              <a:bodyPr wrap="none" lIns="0" tIns="0" rIns="0" bIns="0" rtlCol="0">
+                <a:spAutoFit/>
+              </a:bodyPr>
+              <a:lstStyle/>
+              <a:p>
+                <a:pPr/>
+                <a14:m>
+                  <m:oMathPara xmlns:m="http://schemas.openxmlformats.org/officeDocument/2006/math">
+                    <m:oMathParaPr>
+                      <m:jc m:val="centerGroup"/>
+                    </m:oMathParaPr>
+                    <m:oMath xmlns:m="http://schemas.openxmlformats.org/officeDocument/2006/math">
+                      <m:sSubSup>
+                        <m:sSubSupPr>
+                          <m:ctrlPr>
+                            <a:rPr lang="en-CA" b="0" i="1" smtClean="0">
+                              <a:latin typeface="Cambria Math" panose="02040503050406030204" pitchFamily="18" charset="0"/>
+                            </a:rPr>
+                          </m:ctrlPr>
+                        </m:sSubSupPr>
+                        <m:e>
+                          <m:r>
+                            <a:rPr lang="en-CA" b="0" i="1" smtClean="0">
+                              <a:latin typeface="Cambria Math" panose="02040503050406030204" pitchFamily="18" charset="0"/>
+                            </a:rPr>
+                            <m:t>𝜎</m:t>
+                          </m:r>
+                        </m:e>
+                        <m:sub>
+                          <m:r>
+                            <a:rPr lang="en-CA" b="0" i="1" smtClean="0">
+                              <a:latin typeface="Cambria Math" panose="02040503050406030204" pitchFamily="18" charset="0"/>
+                            </a:rPr>
+                            <m:t>0</m:t>
+                          </m:r>
+                        </m:sub>
+                        <m:sup>
+                          <m:r>
+                            <a:rPr lang="en-CA" b="0" i="1" smtClean="0">
+                              <a:latin typeface="Cambria Math" panose="02040503050406030204" pitchFamily="18" charset="0"/>
+                            </a:rPr>
+                            <m:t>𝑧</m:t>
+                          </m:r>
+                        </m:sup>
+                      </m:sSubSup>
+                    </m:oMath>
+                  </m:oMathPara>
+                </a14:m>
+                <a:endParaRPr lang="en-CA" dirty="0"/>
+              </a:p>
+            </p:txBody>
+          </p:sp>
+        </mc:Choice>
+        <mc:Fallback>
+          <p:sp>
+            <p:nvSpPr>
+              <p:cNvPr id="11" name="TextBox 10">
+                <a:extLst>
+                  <a:ext uri="{FF2B5EF4-FFF2-40B4-BE49-F238E27FC236}">
+                    <a16:creationId xmlns:a16="http://schemas.microsoft.com/office/drawing/2014/main" id="{8350158A-D74B-4C93-8191-40350CB5F2BD}"/>
+                  </a:ext>
+                </a:extLst>
+              </p:cNvPr>
+              <p:cNvSpPr txBox="1">
+                <a:spLocks noRot="1" noChangeAspect="1" noMove="1" noResize="1" noEditPoints="1" noAdjustHandles="1" noChangeArrowheads="1" noChangeShapeType="1" noTextEdit="1"/>
+              </p:cNvSpPr>
+              <p:nvPr/>
+            </p:nvSpPr>
+            <p:spPr>
+              <a:xfrm>
+                <a:off x="3468466" y="2225335"/>
+                <a:ext cx="310662" cy="276999"/>
+              </a:xfrm>
+              <a:prstGeom prst="rect">
+                <a:avLst/>
+              </a:prstGeom>
+              <a:blipFill>
+                <a:blip r:embed="rId2"/>
+                <a:stretch>
+                  <a:fillRect l="-11765" b="-20000"/>
+                </a:stretch>
+              </a:blipFill>
+            </p:spPr>
+            <p:txBody>
+              <a:bodyPr/>
+              <a:lstStyle/>
+              <a:p>
+                <a:r>
+                  <a:rPr lang="en-CA">
+                    <a:noFill/>
+                  </a:rPr>
+                  <a:t> </a:t>
+                </a:r>
+              </a:p>
+            </p:txBody>
+          </p:sp>
+        </mc:Fallback>
+      </mc:AlternateContent>
+      <p:sp>
+        <p:nvSpPr>
+          <p:cNvPr id="12" name="Oval 11">
+            <a:extLst>
+              <a:ext uri="{FF2B5EF4-FFF2-40B4-BE49-F238E27FC236}">
+                <a16:creationId xmlns:a16="http://schemas.microsoft.com/office/drawing/2014/main" id="{30E1AB0E-5C23-4913-8979-D41B10D4B91E}"/>
+              </a:ext>
+            </a:extLst>
+          </p:cNvPr>
+          <p:cNvSpPr/>
+          <p:nvPr/>
+        </p:nvSpPr>
+        <p:spPr>
+          <a:xfrm>
+            <a:off x="3364053" y="2754414"/>
+            <a:ext cx="561109" cy="514347"/>
+          </a:xfrm>
+          <a:prstGeom prst="ellipse">
+            <a:avLst/>
+          </a:prstGeom>
+        </p:spPr>
+        <p:style>
+          <a:lnRef idx="2">
+            <a:schemeClr val="dk1"/>
+          </a:lnRef>
+          <a:fillRef idx="1">
+            <a:schemeClr val="lt1"/>
+          </a:fillRef>
+          <a:effectRef idx="0">
+            <a:schemeClr val="dk1"/>
+          </a:effectRef>
+          <a:fontRef idx="minor">
+            <a:schemeClr val="dk1"/>
+          </a:fontRef>
+        </p:style>
+        <p:txBody>
+          <a:bodyPr rtlCol="0" anchor="ctr"/>
+          <a:lstStyle/>
+          <a:p>
+            <a:pPr algn="ctr"/>
+            <a:endParaRPr lang="en-CA" dirty="0"/>
+          </a:p>
+        </p:txBody>
+      </p:sp>
+      <mc:AlternateContent xmlns:mc="http://schemas.openxmlformats.org/markup-compatibility/2006">
+        <mc:Choice xmlns:a14="http://schemas.microsoft.com/office/drawing/2010/main" Requires="a14">
+          <p:sp>
+            <p:nvSpPr>
+              <p:cNvPr id="13" name="TextBox 12">
+                <a:extLst>
+                  <a:ext uri="{FF2B5EF4-FFF2-40B4-BE49-F238E27FC236}">
+                    <a16:creationId xmlns:a16="http://schemas.microsoft.com/office/drawing/2014/main" id="{E5CF1BE8-F4C2-4744-9002-34E640A30605}"/>
+                  </a:ext>
+                </a:extLst>
+              </p:cNvPr>
+              <p:cNvSpPr txBox="1"/>
+              <p:nvPr/>
+            </p:nvSpPr>
+            <p:spPr>
+              <a:xfrm>
+                <a:off x="3489276" y="2847114"/>
+                <a:ext cx="310662" cy="276999"/>
               </a:xfrm>
               <a:prstGeom prst="rect">
                 <a:avLst/>
@@ -4265,13 +4432,13 @@
             </p:txBody>
           </p:sp>
         </mc:Choice>
-        <mc:Fallback xmlns="">
+        <mc:Fallback>
           <p:sp>
             <p:nvSpPr>
-              <p:cNvPr id="11" name="TextBox 10">
+              <p:cNvPr id="13" name="TextBox 12">
                 <a:extLst>
                   <a:ext uri="{FF2B5EF4-FFF2-40B4-BE49-F238E27FC236}">
-                    <a16:creationId xmlns:a16="http://schemas.microsoft.com/office/drawing/2014/main" id="{8350158A-D74B-4C93-8191-40350CB5F2BD}"/>
+                    <a16:creationId xmlns:a16="http://schemas.microsoft.com/office/drawing/2014/main" id="{E5CF1BE8-F4C2-4744-9002-34E640A30605}"/>
                   </a:ext>
                 </a:extLst>
               </p:cNvPr>
@@ -4282,16 +4449,16 @@
             </p:nvSpPr>
             <p:spPr>
               <a:xfrm>
-                <a:off x="3468466" y="2225335"/>
-                <a:ext cx="310661" cy="276999"/>
+                <a:off x="3489276" y="2847114"/>
+                <a:ext cx="310662" cy="276999"/>
               </a:xfrm>
               <a:prstGeom prst="rect">
                 <a:avLst/>
               </a:prstGeom>
               <a:blipFill>
-                <a:blip r:embed="rId10"/>
+                <a:blip r:embed="rId3"/>
                 <a:stretch>
-                  <a:fillRect l="-11765" b="-20000"/>
+                  <a:fillRect l="-11765" r="-1961" b="-20000"/>
                 </a:stretch>
               </a:blipFill>
             </p:spPr>
@@ -4312,10 +4479,10 @@
       </mc:AlternateContent>
       <p:sp>
         <p:nvSpPr>
-          <p:cNvPr id="12" name="Oval 11">
-            <a:extLst>
-              <a:ext uri="{FF2B5EF4-FFF2-40B4-BE49-F238E27FC236}">
-                <a16:creationId xmlns:a16="http://schemas.microsoft.com/office/drawing/2014/main" id="{30E1AB0E-5C23-4913-8979-D41B10D4B91E}"/>
+          <p:cNvPr id="16" name="Oval 15">
+            <a:extLst>
+              <a:ext uri="{FF2B5EF4-FFF2-40B4-BE49-F238E27FC236}">
+                <a16:creationId xmlns:a16="http://schemas.microsoft.com/office/drawing/2014/main" id="{5AC7EB95-BE06-4C55-BB72-074DC157BC56}"/>
               </a:ext>
             </a:extLst>
           </p:cNvPr>
@@ -4324,7 +4491,7 @@
         </p:nvSpPr>
         <p:spPr>
           <a:xfrm>
-            <a:off x="3364053" y="2754414"/>
+            <a:off x="3364053" y="3387436"/>
             <a:ext cx="561109" cy="514347"/>
           </a:xfrm>
           <a:prstGeom prst="ellipse">
@@ -4354,14 +4521,14 @@
           </a:p>
         </p:txBody>
       </p:sp>
-      <mc:AlternateContent xmlns:mc="http://schemas.openxmlformats.org/markup-compatibility/2006" xmlns:a14="http://schemas.microsoft.com/office/drawing/2010/main">
-        <mc:Choice Requires="a14">
+      <mc:AlternateContent xmlns:mc="http://schemas.openxmlformats.org/markup-compatibility/2006">
+        <mc:Choice xmlns:a14="http://schemas.microsoft.com/office/drawing/2010/main" Requires="a14">
           <p:sp>
             <p:nvSpPr>
-              <p:cNvPr id="13" name="TextBox 12">
+              <p:cNvPr id="17" name="TextBox 16">
                 <a:extLst>
                   <a:ext uri="{FF2B5EF4-FFF2-40B4-BE49-F238E27FC236}">
-                    <a16:creationId xmlns:a16="http://schemas.microsoft.com/office/drawing/2014/main" id="{E5CF1BE8-F4C2-4744-9002-34E640A30605}"/>
+                    <a16:creationId xmlns:a16="http://schemas.microsoft.com/office/drawing/2014/main" id="{153D983E-70B1-4FD5-B89F-C025023196C8}"/>
                   </a:ext>
                 </a:extLst>
               </p:cNvPr>
@@ -4370,7 +4537,7 @@
             </p:nvSpPr>
             <p:spPr>
               <a:xfrm>
-                <a:off x="3489276" y="2847114"/>
+                <a:off x="3489276" y="3475754"/>
                 <a:ext cx="310662" cy="276999"/>
               </a:xfrm>
               <a:prstGeom prst="rect">
@@ -4432,174 +4599,7 @@
             </p:txBody>
           </p:sp>
         </mc:Choice>
-        <mc:Fallback xmlns="">
-          <p:sp>
-            <p:nvSpPr>
-              <p:cNvPr id="13" name="TextBox 12">
-                <a:extLst>
-                  <a:ext uri="{FF2B5EF4-FFF2-40B4-BE49-F238E27FC236}">
-                    <a16:creationId xmlns:a16="http://schemas.microsoft.com/office/drawing/2014/main" id="{E5CF1BE8-F4C2-4744-9002-34E640A30605}"/>
-                  </a:ext>
-                </a:extLst>
-              </p:cNvPr>
-              <p:cNvSpPr txBox="1">
-                <a:spLocks noRot="1" noChangeAspect="1" noMove="1" noResize="1" noEditPoints="1" noAdjustHandles="1" noChangeArrowheads="1" noChangeShapeType="1" noTextEdit="1"/>
-              </p:cNvSpPr>
-              <p:nvPr/>
-            </p:nvSpPr>
-            <p:spPr>
-              <a:xfrm>
-                <a:off x="3489276" y="2847114"/>
-                <a:ext cx="310662" cy="276999"/>
-              </a:xfrm>
-              <a:prstGeom prst="rect">
-                <a:avLst/>
-              </a:prstGeom>
-              <a:blipFill>
-                <a:blip r:embed="rId3"/>
-                <a:stretch>
-                  <a:fillRect l="-11765" r="-1961" b="-20000"/>
-                </a:stretch>
-              </a:blipFill>
-            </p:spPr>
-            <p:txBody>
-              <a:bodyPr/>
-              <a:lstStyle/>
-              <a:p>
-                <a:r>
-                  <a:rPr lang="en-CA">
-                    <a:noFill/>
-                  </a:rPr>
-                  <a:t> </a:t>
-                </a:r>
-              </a:p>
-            </p:txBody>
-          </p:sp>
-        </mc:Fallback>
-      </mc:AlternateContent>
-      <p:sp>
-        <p:nvSpPr>
-          <p:cNvPr id="16" name="Oval 15">
-            <a:extLst>
-              <a:ext uri="{FF2B5EF4-FFF2-40B4-BE49-F238E27FC236}">
-                <a16:creationId xmlns:a16="http://schemas.microsoft.com/office/drawing/2014/main" id="{5AC7EB95-BE06-4C55-BB72-074DC157BC56}"/>
-              </a:ext>
-            </a:extLst>
-          </p:cNvPr>
-          <p:cNvSpPr/>
-          <p:nvPr/>
-        </p:nvSpPr>
-        <p:spPr>
-          <a:xfrm>
-            <a:off x="3364053" y="3387436"/>
-            <a:ext cx="561109" cy="514347"/>
-          </a:xfrm>
-          <a:prstGeom prst="ellipse">
-            <a:avLst/>
-          </a:prstGeom>
-        </p:spPr>
-        <p:style>
-          <a:lnRef idx="2">
-            <a:schemeClr val="dk1"/>
-          </a:lnRef>
-          <a:fillRef idx="1">
-            <a:schemeClr val="lt1"/>
-          </a:fillRef>
-          <a:effectRef idx="0">
-            <a:schemeClr val="dk1"/>
-          </a:effectRef>
-          <a:fontRef idx="minor">
-            <a:schemeClr val="dk1"/>
-          </a:fontRef>
-        </p:style>
-        <p:txBody>
-          <a:bodyPr rtlCol="0" anchor="ctr"/>
-          <a:lstStyle/>
-          <a:p>
-            <a:pPr algn="ctr"/>
-            <a:endParaRPr lang="en-CA" dirty="0"/>
-          </a:p>
-        </p:txBody>
-      </p:sp>
-      <mc:AlternateContent xmlns:mc="http://schemas.openxmlformats.org/markup-compatibility/2006" xmlns:a14="http://schemas.microsoft.com/office/drawing/2010/main">
-        <mc:Choice Requires="a14">
-          <p:sp>
-            <p:nvSpPr>
-              <p:cNvPr id="17" name="TextBox 16">
-                <a:extLst>
-                  <a:ext uri="{FF2B5EF4-FFF2-40B4-BE49-F238E27FC236}">
-                    <a16:creationId xmlns:a16="http://schemas.microsoft.com/office/drawing/2014/main" id="{153D983E-70B1-4FD5-B89F-C025023196C8}"/>
-                  </a:ext>
-                </a:extLst>
-              </p:cNvPr>
-              <p:cNvSpPr txBox="1"/>
-              <p:nvPr/>
-            </p:nvSpPr>
-            <p:spPr>
-              <a:xfrm>
-                <a:off x="3489276" y="3475754"/>
-                <a:ext cx="310662" cy="276999"/>
-              </a:xfrm>
-              <a:prstGeom prst="rect">
-                <a:avLst/>
-              </a:prstGeom>
-              <a:noFill/>
-            </p:spPr>
-            <p:txBody>
-              <a:bodyPr wrap="none" lIns="0" tIns="0" rIns="0" bIns="0" rtlCol="0">
-                <a:spAutoFit/>
-              </a:bodyPr>
-              <a:lstStyle/>
-              <a:p>
-                <a:pPr/>
-                <a14:m>
-                  <m:oMathPara xmlns:m="http://schemas.openxmlformats.org/officeDocument/2006/math">
-                    <m:oMathParaPr>
-                      <m:jc m:val="centerGroup"/>
-                    </m:oMathParaPr>
-                    <m:oMath xmlns:m="http://schemas.openxmlformats.org/officeDocument/2006/math">
-                      <m:sSubSup>
-                        <m:sSubSupPr>
-                          <m:ctrlPr>
-                            <a:rPr lang="en-CA" b="0" i="1" smtClean="0">
-                              <a:latin typeface="Cambria Math" panose="02040503050406030204" pitchFamily="18" charset="0"/>
-                            </a:rPr>
-                          </m:ctrlPr>
-                        </m:sSubSupPr>
-                        <m:e>
-                          <m:r>
-                            <a:rPr lang="en-CA" b="0" i="1" smtClean="0">
-                              <a:latin typeface="Cambria Math" panose="02040503050406030204" pitchFamily="18" charset="0"/>
-                            </a:rPr>
-                            <m:t>𝜎</m:t>
-                          </m:r>
-                        </m:e>
-                        <m:sub>
-                          <m:r>
-                            <a:rPr lang="en-CA" b="0" i="1" smtClean="0">
-                              <a:latin typeface="Cambria Math" panose="02040503050406030204" pitchFamily="18" charset="0"/>
-                            </a:rPr>
-                            <m:t>3</m:t>
-                          </m:r>
-                        </m:sub>
-                        <m:sup>
-                          <m:r>
-                            <a:rPr lang="en-CA" b="0" i="1" smtClean="0">
-                              <a:latin typeface="Cambria Math" panose="02040503050406030204" pitchFamily="18" charset="0"/>
-                            </a:rPr>
-                            <m:t>𝑧</m:t>
-                          </m:r>
-                        </m:sup>
-                      </m:sSubSup>
-                    </m:oMath>
-                  </m:oMathPara>
-                </a14:m>
-                <a:endParaRPr lang="en-CA" dirty="0"/>
-              </a:p>
-            </p:txBody>
-          </p:sp>
-        </mc:Choice>
-        <mc:Fallback xmlns="">
+        <mc:Fallback>
           <p:sp>
             <p:nvSpPr>
               <p:cNvPr id="17" name="TextBox 16">
@@ -4735,8 +4735,8 @@
           </a:p>
         </p:txBody>
       </p:sp>
-      <mc:AlternateContent xmlns:mc="http://schemas.openxmlformats.org/markup-compatibility/2006" xmlns:a14="http://schemas.microsoft.com/office/drawing/2010/main">
-        <mc:Choice Requires="a14">
+      <mc:AlternateContent xmlns:mc="http://schemas.openxmlformats.org/markup-compatibility/2006">
+        <mc:Choice xmlns:a14="http://schemas.microsoft.com/office/drawing/2010/main" Requires="a14">
           <p:sp>
             <p:nvSpPr>
               <p:cNvPr id="20" name="TextBox 19">
@@ -4751,8 +4751,8 @@
             </p:nvSpPr>
             <p:spPr>
               <a:xfrm>
-                <a:off x="3488667" y="4951271"/>
-                <a:ext cx="311880" cy="276999"/>
+                <a:off x="3386493" y="4945855"/>
+                <a:ext cx="531492" cy="276999"/>
               </a:xfrm>
               <a:prstGeom prst="rect">
                 <a:avLst/>
@@ -4795,6 +4795,12 @@
                             </a:rPr>
                             <m:t>𝑁</m:t>
                           </m:r>
+                          <m:r>
+                            <a:rPr lang="en-CA" b="0" i="1" smtClean="0">
+                              <a:latin typeface="Cambria Math" panose="02040503050406030204" pitchFamily="18" charset="0"/>
+                            </a:rPr>
+                            <m:t>−1</m:t>
+                          </m:r>
                         </m:sub>
                         <m:sup>
                           <m:r>
@@ -4813,7 +4819,7 @@
             </p:txBody>
           </p:sp>
         </mc:Choice>
-        <mc:Fallback xmlns="">
+        <mc:Fallback>
           <p:sp>
             <p:nvSpPr>
               <p:cNvPr id="20" name="TextBox 19">
@@ -4830,8 +4836,8 @@
             </p:nvSpPr>
             <p:spPr>
               <a:xfrm>
-                <a:off x="3488667" y="4951271"/>
-                <a:ext cx="311880" cy="276999"/>
+                <a:off x="3386493" y="4945855"/>
+                <a:ext cx="531492" cy="276999"/>
               </a:xfrm>
               <a:prstGeom prst="rect">
                 <a:avLst/>
@@ -4839,7 +4845,7 @@
               <a:blipFill>
                 <a:blip r:embed="rId5"/>
                 <a:stretch>
-                  <a:fillRect l="-11765" r="-5882" b="-17391"/>
+                  <a:fillRect l="-5747" r="-3448" b="-17391"/>
                 </a:stretch>
               </a:blipFill>
             </p:spPr>
@@ -5592,8 +5598,8 @@
           </a:p>
         </p:txBody>
       </p:sp>
-      <mc:AlternateContent xmlns:mc="http://schemas.openxmlformats.org/markup-compatibility/2006" xmlns:a14="http://schemas.microsoft.com/office/drawing/2010/main">
-        <mc:Choice Requires="a14">
+      <mc:AlternateContent xmlns:mc="http://schemas.openxmlformats.org/markup-compatibility/2006">
+        <mc:Choice xmlns:a14="http://schemas.microsoft.com/office/drawing/2010/main" Requires="a14">
           <p:sp>
             <p:nvSpPr>
               <p:cNvPr id="39" name="TextBox 38">
@@ -5609,7 +5615,7 @@
             <p:spPr>
               <a:xfrm>
                 <a:off x="2939843" y="2225335"/>
-                <a:ext cx="283154" cy="276999"/>
+                <a:ext cx="288477" cy="276999"/>
               </a:xfrm>
               <a:prstGeom prst="rect">
                 <a:avLst/>
@@ -5650,7 +5656,7 @@
                             <a:rPr lang="en-CA" b="0" i="1" smtClean="0">
                               <a:latin typeface="Cambria Math" panose="02040503050406030204" pitchFamily="18" charset="0"/>
                             </a:rPr>
-                            <m:t>1</m:t>
+                            <m:t>0</m:t>
                           </m:r>
                         </m:sub>
                       </m:sSub>
@@ -5662,7 +5668,7 @@
             </p:txBody>
           </p:sp>
         </mc:Choice>
-        <mc:Fallback xmlns="">
+        <mc:Fallback>
           <p:sp>
             <p:nvSpPr>
               <p:cNvPr id="39" name="TextBox 38">
@@ -5680,15 +5686,15 @@
             <p:spPr>
               <a:xfrm>
                 <a:off x="2939843" y="2225335"/>
-                <a:ext cx="283154" cy="276999"/>
+                <a:ext cx="288477" cy="276999"/>
               </a:xfrm>
               <a:prstGeom prst="rect">
                 <a:avLst/>
               </a:prstGeom>
               <a:blipFill>
-                <a:blip r:embed="rId11"/>
+                <a:blip r:embed="rId10"/>
                 <a:stretch>
-                  <a:fillRect l="-12766" r="-6383" b="-17778"/>
+                  <a:fillRect l="-12500" r="-6250" b="-17778"/>
                 </a:stretch>
               </a:blipFill>
             </p:spPr>
@@ -5707,8 +5713,8 @@
           </p:sp>
         </mc:Fallback>
       </mc:AlternateContent>
-      <mc:AlternateContent xmlns:mc="http://schemas.openxmlformats.org/markup-compatibility/2006" xmlns:a14="http://schemas.microsoft.com/office/drawing/2010/main">
-        <mc:Choice Requires="a14">
+      <mc:AlternateContent xmlns:mc="http://schemas.openxmlformats.org/markup-compatibility/2006">
+        <mc:Choice xmlns:a14="http://schemas.microsoft.com/office/drawing/2010/main" Requires="a14">
           <p:sp>
             <p:nvSpPr>
               <p:cNvPr id="40" name="TextBox 39">
@@ -5765,7 +5771,7 @@
                             <a:rPr lang="en-CA" b="0" i="1" smtClean="0">
                               <a:latin typeface="Cambria Math" panose="02040503050406030204" pitchFamily="18" charset="0"/>
                             </a:rPr>
-                            <m:t>2</m:t>
+                            <m:t>1</m:t>
                           </m:r>
                         </m:sub>
                       </m:sSub>
@@ -5777,7 +5783,7 @@
             </p:txBody>
           </p:sp>
         </mc:Choice>
-        <mc:Fallback xmlns="">
+        <mc:Fallback>
           <p:sp>
             <p:nvSpPr>
               <p:cNvPr id="40" name="TextBox 39">
@@ -5801,9 +5807,9 @@
                 <a:avLst/>
               </a:prstGeom>
               <a:blipFill>
-                <a:blip r:embed="rId12"/>
+                <a:blip r:embed="rId11"/>
                 <a:stretch>
-                  <a:fillRect l="-12500" r="-6250" b="-15556"/>
+                  <a:fillRect l="-10417" r="-6250" b="-15556"/>
                 </a:stretch>
               </a:blipFill>
             </p:spPr>
@@ -5937,8 +5943,8 @@
           </p:sp>
         </mc:Fallback>
       </mc:AlternateContent>
-      <mc:AlternateContent xmlns:mc="http://schemas.openxmlformats.org/markup-compatibility/2006" xmlns:a14="http://schemas.microsoft.com/office/drawing/2010/main">
-        <mc:Choice Requires="a14">
+      <mc:AlternateContent xmlns:mc="http://schemas.openxmlformats.org/markup-compatibility/2006">
+        <mc:Choice xmlns:a14="http://schemas.microsoft.com/office/drawing/2010/main" Requires="a14">
           <p:sp>
             <p:nvSpPr>
               <p:cNvPr id="42" name="TextBox 41">
@@ -5953,8 +5959,8 @@
             </p:nvSpPr>
             <p:spPr>
               <a:xfrm>
-                <a:off x="2941610" y="4926714"/>
-                <a:ext cx="321242" cy="276999"/>
+                <a:off x="2822330" y="4926714"/>
+                <a:ext cx="540854" cy="276999"/>
               </a:xfrm>
               <a:prstGeom prst="rect">
                 <a:avLst/>
@@ -5997,6 +6003,12 @@
                             </a:rPr>
                             <m:t>𝑁</m:t>
                           </m:r>
+                          <m:r>
+                            <a:rPr lang="en-CA" b="0" i="1" smtClean="0">
+                              <a:latin typeface="Cambria Math" panose="02040503050406030204" pitchFamily="18" charset="0"/>
+                            </a:rPr>
+                            <m:t>−1</m:t>
+                          </m:r>
                         </m:sub>
                       </m:sSub>
                     </m:oMath>
@@ -6007,7 +6019,7 @@
             </p:txBody>
           </p:sp>
         </mc:Choice>
-        <mc:Fallback xmlns="">
+        <mc:Fallback>
           <p:sp>
             <p:nvSpPr>
               <p:cNvPr id="42" name="TextBox 41">
@@ -6024,8 +6036,8 @@
             </p:nvSpPr>
             <p:spPr>
               <a:xfrm>
-                <a:off x="2941610" y="4926714"/>
-                <a:ext cx="321242" cy="276999"/>
+                <a:off x="2822330" y="4926714"/>
+                <a:ext cx="540854" cy="276999"/>
               </a:xfrm>
               <a:prstGeom prst="rect">
                 <a:avLst/>
@@ -6033,7 +6045,7 @@
               <a:blipFill>
                 <a:blip r:embed="rId14"/>
                 <a:stretch>
-                  <a:fillRect l="-9615" r="-7692" b="-15217"/>
+                  <a:fillRect l="-5618" r="-3371" b="-15217"/>
                 </a:stretch>
               </a:blipFill>
             </p:spPr>
@@ -6397,8 +6409,8 @@
           </p:sp>
         </mc:Fallback>
       </mc:AlternateContent>
-      <mc:AlternateContent xmlns:mc="http://schemas.openxmlformats.org/markup-compatibility/2006">
-        <mc:Choice xmlns:a14="http://schemas.microsoft.com/office/drawing/2010/main" Requires="a14">
+      <mc:AlternateContent xmlns:mc="http://schemas.openxmlformats.org/markup-compatibility/2006" xmlns:a14="http://schemas.microsoft.com/office/drawing/2010/main">
+        <mc:Choice Requires="a14">
           <p:sp>
             <p:nvSpPr>
               <p:cNvPr id="61" name="TextBox 60">
@@ -6467,7 +6479,7 @@
             </p:txBody>
           </p:sp>
         </mc:Choice>
-        <mc:Fallback>
+        <mc:Fallback xmlns="">
           <p:sp>
             <p:nvSpPr>
               <p:cNvPr id="61" name="TextBox 60">

</xml_diff>

<commit_message>
Modified Figures for Report
</commit_message>
<xml_diff>
--- a/Figures/Fall2019/RBMfigure.pptx
+++ b/Figures/Fall2019/RBMfigure.pptx
@@ -8,6 +8,9 @@
     <p:sldId id="256" r:id="rId2"/>
     <p:sldId id="257" r:id="rId3"/>
     <p:sldId id="258" r:id="rId4"/>
+    <p:sldId id="259" r:id="rId5"/>
+    <p:sldId id="260" r:id="rId6"/>
+    <p:sldId id="261" r:id="rId7"/>
   </p:sldIdLst>
   <p:sldSz cx="12192000" cy="6858000"/>
   <p:notesSz cx="6858000" cy="9144000"/>
@@ -263,7 +266,7 @@
           <a:p>
             <a:fld id="{512C11B2-92EB-42FC-99BC-4AAF8E534B76}" type="datetimeFigureOut">
               <a:rPr lang="en-CA" smtClean="0"/>
-              <a:t>2020-04-11</a:t>
+              <a:t>2020-04-14</a:t>
             </a:fld>
             <a:endParaRPr lang="en-CA"/>
           </a:p>
@@ -463,7 +466,7 @@
           <a:p>
             <a:fld id="{512C11B2-92EB-42FC-99BC-4AAF8E534B76}" type="datetimeFigureOut">
               <a:rPr lang="en-CA" smtClean="0"/>
-              <a:t>2020-04-11</a:t>
+              <a:t>2020-04-14</a:t>
             </a:fld>
             <a:endParaRPr lang="en-CA"/>
           </a:p>
@@ -673,7 +676,7 @@
           <a:p>
             <a:fld id="{512C11B2-92EB-42FC-99BC-4AAF8E534B76}" type="datetimeFigureOut">
               <a:rPr lang="en-CA" smtClean="0"/>
-              <a:t>2020-04-11</a:t>
+              <a:t>2020-04-14</a:t>
             </a:fld>
             <a:endParaRPr lang="en-CA"/>
           </a:p>
@@ -873,7 +876,7 @@
           <a:p>
             <a:fld id="{512C11B2-92EB-42FC-99BC-4AAF8E534B76}" type="datetimeFigureOut">
               <a:rPr lang="en-CA" smtClean="0"/>
-              <a:t>2020-04-11</a:t>
+              <a:t>2020-04-14</a:t>
             </a:fld>
             <a:endParaRPr lang="en-CA"/>
           </a:p>
@@ -1149,7 +1152,7 @@
           <a:p>
             <a:fld id="{512C11B2-92EB-42FC-99BC-4AAF8E534B76}" type="datetimeFigureOut">
               <a:rPr lang="en-CA" smtClean="0"/>
-              <a:t>2020-04-11</a:t>
+              <a:t>2020-04-14</a:t>
             </a:fld>
             <a:endParaRPr lang="en-CA"/>
           </a:p>
@@ -1417,7 +1420,7 @@
           <a:p>
             <a:fld id="{512C11B2-92EB-42FC-99BC-4AAF8E534B76}" type="datetimeFigureOut">
               <a:rPr lang="en-CA" smtClean="0"/>
-              <a:t>2020-04-11</a:t>
+              <a:t>2020-04-14</a:t>
             </a:fld>
             <a:endParaRPr lang="en-CA"/>
           </a:p>
@@ -1832,7 +1835,7 @@
           <a:p>
             <a:fld id="{512C11B2-92EB-42FC-99BC-4AAF8E534B76}" type="datetimeFigureOut">
               <a:rPr lang="en-CA" smtClean="0"/>
-              <a:t>2020-04-11</a:t>
+              <a:t>2020-04-14</a:t>
             </a:fld>
             <a:endParaRPr lang="en-CA"/>
           </a:p>
@@ -1974,7 +1977,7 @@
           <a:p>
             <a:fld id="{512C11B2-92EB-42FC-99BC-4AAF8E534B76}" type="datetimeFigureOut">
               <a:rPr lang="en-CA" smtClean="0"/>
-              <a:t>2020-04-11</a:t>
+              <a:t>2020-04-14</a:t>
             </a:fld>
             <a:endParaRPr lang="en-CA"/>
           </a:p>
@@ -2087,7 +2090,7 @@
           <a:p>
             <a:fld id="{512C11B2-92EB-42FC-99BC-4AAF8E534B76}" type="datetimeFigureOut">
               <a:rPr lang="en-CA" smtClean="0"/>
-              <a:t>2020-04-11</a:t>
+              <a:t>2020-04-14</a:t>
             </a:fld>
             <a:endParaRPr lang="en-CA"/>
           </a:p>
@@ -2400,7 +2403,7 @@
           <a:p>
             <a:fld id="{512C11B2-92EB-42FC-99BC-4AAF8E534B76}" type="datetimeFigureOut">
               <a:rPr lang="en-CA" smtClean="0"/>
-              <a:t>2020-04-11</a:t>
+              <a:t>2020-04-14</a:t>
             </a:fld>
             <a:endParaRPr lang="en-CA"/>
           </a:p>
@@ -2689,7 +2692,7 @@
           <a:p>
             <a:fld id="{512C11B2-92EB-42FC-99BC-4AAF8E534B76}" type="datetimeFigureOut">
               <a:rPr lang="en-CA" smtClean="0"/>
-              <a:t>2020-04-11</a:t>
+              <a:t>2020-04-14</a:t>
             </a:fld>
             <a:endParaRPr lang="en-CA"/>
           </a:p>
@@ -2932,7 +2935,7 @@
           <a:p>
             <a:fld id="{512C11B2-92EB-42FC-99BC-4AAF8E534B76}" type="datetimeFigureOut">
               <a:rPr lang="en-CA" smtClean="0"/>
-              <a:t>2020-04-11</a:t>
+              <a:t>2020-04-14</a:t>
             </a:fld>
             <a:endParaRPr lang="en-CA"/>
           </a:p>
@@ -4187,8 +4190,8 @@
           </a:p>
         </p:txBody>
       </p:sp>
-      <mc:AlternateContent xmlns:mc="http://schemas.openxmlformats.org/markup-compatibility/2006">
-        <mc:Choice xmlns:a14="http://schemas.microsoft.com/office/drawing/2010/main" Requires="a14">
+      <mc:AlternateContent xmlns:mc="http://schemas.openxmlformats.org/markup-compatibility/2006" xmlns:a14="http://schemas.microsoft.com/office/drawing/2010/main">
+        <mc:Choice Requires="a14">
           <p:sp>
             <p:nvSpPr>
               <p:cNvPr id="11" name="TextBox 10">
@@ -4265,7 +4268,7 @@
             </p:txBody>
           </p:sp>
         </mc:Choice>
-        <mc:Fallback>
+        <mc:Fallback xmlns="">
           <p:sp>
             <p:nvSpPr>
               <p:cNvPr id="11" name="TextBox 10">
@@ -4354,8 +4357,8 @@
           </a:p>
         </p:txBody>
       </p:sp>
-      <mc:AlternateContent xmlns:mc="http://schemas.openxmlformats.org/markup-compatibility/2006">
-        <mc:Choice xmlns:a14="http://schemas.microsoft.com/office/drawing/2010/main" Requires="a14">
+      <mc:AlternateContent xmlns:mc="http://schemas.openxmlformats.org/markup-compatibility/2006" xmlns:a14="http://schemas.microsoft.com/office/drawing/2010/main">
+        <mc:Choice Requires="a14">
           <p:sp>
             <p:nvSpPr>
               <p:cNvPr id="13" name="TextBox 12">
@@ -4432,7 +4435,7 @@
             </p:txBody>
           </p:sp>
         </mc:Choice>
-        <mc:Fallback>
+        <mc:Fallback xmlns="">
           <p:sp>
             <p:nvSpPr>
               <p:cNvPr id="13" name="TextBox 12">
@@ -4521,8 +4524,8 @@
           </a:p>
         </p:txBody>
       </p:sp>
-      <mc:AlternateContent xmlns:mc="http://schemas.openxmlformats.org/markup-compatibility/2006">
-        <mc:Choice xmlns:a14="http://schemas.microsoft.com/office/drawing/2010/main" Requires="a14">
+      <mc:AlternateContent xmlns:mc="http://schemas.openxmlformats.org/markup-compatibility/2006" xmlns:a14="http://schemas.microsoft.com/office/drawing/2010/main">
+        <mc:Choice Requires="a14">
           <p:sp>
             <p:nvSpPr>
               <p:cNvPr id="17" name="TextBox 16">
@@ -4599,7 +4602,7 @@
             </p:txBody>
           </p:sp>
         </mc:Choice>
-        <mc:Fallback>
+        <mc:Fallback xmlns="">
           <p:sp>
             <p:nvSpPr>
               <p:cNvPr id="17" name="TextBox 16">
@@ -4735,8 +4738,8 @@
           </a:p>
         </p:txBody>
       </p:sp>
-      <mc:AlternateContent xmlns:mc="http://schemas.openxmlformats.org/markup-compatibility/2006">
-        <mc:Choice xmlns:a14="http://schemas.microsoft.com/office/drawing/2010/main" Requires="a14">
+      <mc:AlternateContent xmlns:mc="http://schemas.openxmlformats.org/markup-compatibility/2006" xmlns:a14="http://schemas.microsoft.com/office/drawing/2010/main">
+        <mc:Choice Requires="a14">
           <p:sp>
             <p:nvSpPr>
               <p:cNvPr id="20" name="TextBox 19">
@@ -4819,7 +4822,7 @@
             </p:txBody>
           </p:sp>
         </mc:Choice>
-        <mc:Fallback>
+        <mc:Fallback xmlns="">
           <p:sp>
             <p:nvSpPr>
               <p:cNvPr id="20" name="TextBox 19">
@@ -5623,7 +5626,7 @@
               <a:noFill/>
             </p:spPr>
             <p:txBody>
-              <a:bodyPr wrap="none" lIns="0" tIns="0" rIns="0" bIns="0" rtlCol="0">
+              <a:bodyPr wrap="square" lIns="0" tIns="0" rIns="0" bIns="0" rtlCol="0">
                 <a:spAutoFit/>
               </a:bodyPr>
               <a:lstStyle/>
@@ -5713,8 +5716,8 @@
           </p:sp>
         </mc:Fallback>
       </mc:AlternateContent>
-      <mc:AlternateContent xmlns:mc="http://schemas.openxmlformats.org/markup-compatibility/2006">
-        <mc:Choice xmlns:a14="http://schemas.microsoft.com/office/drawing/2010/main" Requires="a14">
+      <mc:AlternateContent xmlns:mc="http://schemas.openxmlformats.org/markup-compatibility/2006" xmlns:a14="http://schemas.microsoft.com/office/drawing/2010/main">
+        <mc:Choice Requires="a14">
           <p:sp>
             <p:nvSpPr>
               <p:cNvPr id="40" name="TextBox 39">
@@ -5783,7 +5786,7 @@
             </p:txBody>
           </p:sp>
         </mc:Choice>
-        <mc:Fallback>
+        <mc:Fallback xmlns="">
           <p:sp>
             <p:nvSpPr>
               <p:cNvPr id="40" name="TextBox 39">
@@ -5943,8 +5946,8 @@
           </p:sp>
         </mc:Fallback>
       </mc:AlternateContent>
-      <mc:AlternateContent xmlns:mc="http://schemas.openxmlformats.org/markup-compatibility/2006">
-        <mc:Choice xmlns:a14="http://schemas.microsoft.com/office/drawing/2010/main" Requires="a14">
+      <mc:AlternateContent xmlns:mc="http://schemas.openxmlformats.org/markup-compatibility/2006" xmlns:a14="http://schemas.microsoft.com/office/drawing/2010/main">
+        <mc:Choice Requires="a14">
           <p:sp>
             <p:nvSpPr>
               <p:cNvPr id="42" name="TextBox 41">
@@ -6019,7 +6022,7 @@
             </p:txBody>
           </p:sp>
         </mc:Choice>
-        <mc:Fallback>
+        <mc:Fallback xmlns="">
           <p:sp>
             <p:nvSpPr>
               <p:cNvPr id="42" name="TextBox 41">
@@ -6524,6 +6527,366 @@
           </p:sp>
         </mc:Fallback>
       </mc:AlternateContent>
+      <mc:AlternateContent xmlns:mc="http://schemas.openxmlformats.org/markup-compatibility/2006">
+        <mc:Choice xmlns:a14="http://schemas.microsoft.com/office/drawing/2010/main" Requires="a14">
+          <p:sp>
+            <p:nvSpPr>
+              <p:cNvPr id="62" name="TextBox 61">
+                <a:extLst>
+                  <a:ext uri="{FF2B5EF4-FFF2-40B4-BE49-F238E27FC236}">
+                    <a16:creationId xmlns:a16="http://schemas.microsoft.com/office/drawing/2014/main" id="{434456F4-D665-4D32-9417-007BD675F514}"/>
+                  </a:ext>
+                </a:extLst>
+              </p:cNvPr>
+              <p:cNvSpPr txBox="1"/>
+              <p:nvPr/>
+            </p:nvSpPr>
+            <p:spPr>
+              <a:xfrm>
+                <a:off x="5074284" y="1856928"/>
+                <a:ext cx="439766" cy="184666"/>
+              </a:xfrm>
+              <a:prstGeom prst="rect">
+                <a:avLst/>
+              </a:prstGeom>
+              <a:noFill/>
+            </p:spPr>
+            <p:txBody>
+              <a:bodyPr wrap="square" lIns="0" tIns="0" rIns="0" bIns="0" rtlCol="0">
+                <a:spAutoFit/>
+              </a:bodyPr>
+              <a:lstStyle/>
+              <a:p>
+                <a:pPr/>
+                <a14:m>
+                  <m:oMathPara xmlns:m="http://schemas.openxmlformats.org/officeDocument/2006/math">
+                    <m:oMathParaPr>
+                      <m:jc m:val="centerGroup"/>
+                    </m:oMathParaPr>
+                    <m:oMath xmlns:m="http://schemas.openxmlformats.org/officeDocument/2006/math">
+                      <m:sSub>
+                        <m:sSubPr>
+                          <m:ctrlPr>
+                            <a:rPr lang="en-CA" sz="1200" b="0" i="1" smtClean="0">
+                              <a:latin typeface="Cambria Math" panose="02040503050406030204" pitchFamily="18" charset="0"/>
+                            </a:rPr>
+                          </m:ctrlPr>
+                        </m:sSubPr>
+                        <m:e>
+                          <m:r>
+                            <a:rPr lang="en-CA" sz="1200" b="0" i="1" smtClean="0">
+                              <a:latin typeface="Cambria Math" panose="02040503050406030204" pitchFamily="18" charset="0"/>
+                            </a:rPr>
+                            <m:t>𝑊</m:t>
+                          </m:r>
+                        </m:e>
+                        <m:sub>
+                          <m:r>
+                            <a:rPr lang="en-CA" sz="1200" b="0" i="1" smtClean="0">
+                              <a:latin typeface="Cambria Math" panose="02040503050406030204" pitchFamily="18" charset="0"/>
+                            </a:rPr>
+                            <m:t>0</m:t>
+                          </m:r>
+                          <m:r>
+                            <a:rPr lang="en-CA" sz="1200" b="0" i="1" smtClean="0">
+                              <a:latin typeface="Cambria Math" panose="02040503050406030204" pitchFamily="18" charset="0"/>
+                            </a:rPr>
+                            <m:t>1</m:t>
+                          </m:r>
+                        </m:sub>
+                      </m:sSub>
+                    </m:oMath>
+                  </m:oMathPara>
+                </a14:m>
+                <a:endParaRPr lang="en-CA" sz="1200" b="0" dirty="0"/>
+              </a:p>
+            </p:txBody>
+          </p:sp>
+        </mc:Choice>
+        <mc:Fallback>
+          <p:sp>
+            <p:nvSpPr>
+              <p:cNvPr id="62" name="TextBox 61">
+                <a:extLst>
+                  <a:ext uri="{FF2B5EF4-FFF2-40B4-BE49-F238E27FC236}">
+                    <a16:creationId xmlns:a16="http://schemas.microsoft.com/office/drawing/2014/main" id="{434456F4-D665-4D32-9417-007BD675F514}"/>
+                  </a:ext>
+                </a:extLst>
+              </p:cNvPr>
+              <p:cNvSpPr txBox="1">
+                <a:spLocks noRot="1" noChangeAspect="1" noMove="1" noResize="1" noEditPoints="1" noAdjustHandles="1" noChangeArrowheads="1" noChangeShapeType="1" noTextEdit="1"/>
+              </p:cNvSpPr>
+              <p:nvPr/>
+            </p:nvSpPr>
+            <p:spPr>
+              <a:xfrm>
+                <a:off x="5074284" y="1856928"/>
+                <a:ext cx="439766" cy="184666"/>
+              </a:xfrm>
+              <a:prstGeom prst="rect">
+                <a:avLst/>
+              </a:prstGeom>
+              <a:blipFill>
+                <a:blip r:embed="rId19"/>
+                <a:stretch>
+                  <a:fillRect b="-13333"/>
+                </a:stretch>
+              </a:blipFill>
+            </p:spPr>
+            <p:txBody>
+              <a:bodyPr/>
+              <a:lstStyle/>
+              <a:p>
+                <a:r>
+                  <a:rPr lang="en-CA">
+                    <a:noFill/>
+                  </a:rPr>
+                  <a:t> </a:t>
+                </a:r>
+              </a:p>
+            </p:txBody>
+          </p:sp>
+        </mc:Fallback>
+      </mc:AlternateContent>
+      <mc:AlternateContent xmlns:mc="http://schemas.openxmlformats.org/markup-compatibility/2006">
+        <mc:Choice xmlns:a14="http://schemas.microsoft.com/office/drawing/2010/main" Requires="a14">
+          <p:sp>
+            <p:nvSpPr>
+              <p:cNvPr id="63" name="TextBox 62">
+                <a:extLst>
+                  <a:ext uri="{FF2B5EF4-FFF2-40B4-BE49-F238E27FC236}">
+                    <a16:creationId xmlns:a16="http://schemas.microsoft.com/office/drawing/2014/main" id="{BA19D60B-4A70-4CE0-BCCF-1DDBD79354D0}"/>
+                  </a:ext>
+                </a:extLst>
+              </p:cNvPr>
+              <p:cNvSpPr txBox="1"/>
+              <p:nvPr/>
+            </p:nvSpPr>
+            <p:spPr>
+              <a:xfrm>
+                <a:off x="5074284" y="5477228"/>
+                <a:ext cx="439766" cy="202491"/>
+              </a:xfrm>
+              <a:prstGeom prst="rect">
+                <a:avLst/>
+              </a:prstGeom>
+              <a:noFill/>
+            </p:spPr>
+            <p:txBody>
+              <a:bodyPr wrap="square" lIns="0" tIns="0" rIns="0" bIns="0" rtlCol="0">
+                <a:spAutoFit/>
+              </a:bodyPr>
+              <a:lstStyle/>
+              <a:p>
+                <a:pPr/>
+                <a14:m>
+                  <m:oMathPara xmlns:m="http://schemas.openxmlformats.org/officeDocument/2006/math">
+                    <m:oMathParaPr>
+                      <m:jc m:val="centerGroup"/>
+                    </m:oMathParaPr>
+                    <m:oMath xmlns:m="http://schemas.openxmlformats.org/officeDocument/2006/math">
+                      <m:sSub>
+                        <m:sSubPr>
+                          <m:ctrlPr>
+                            <a:rPr lang="en-CA" sz="1200" b="0" i="1" smtClean="0">
+                              <a:latin typeface="Cambria Math" panose="02040503050406030204" pitchFamily="18" charset="0"/>
+                            </a:rPr>
+                          </m:ctrlPr>
+                        </m:sSubPr>
+                        <m:e>
+                          <m:r>
+                            <a:rPr lang="en-CA" sz="1200" b="0" i="1" smtClean="0">
+                              <a:latin typeface="Cambria Math" panose="02040503050406030204" pitchFamily="18" charset="0"/>
+                            </a:rPr>
+                            <m:t>𝑊</m:t>
+                          </m:r>
+                        </m:e>
+                        <m:sub>
+                          <m:d>
+                            <m:dPr>
+                              <m:ctrlPr>
+                                <a:rPr lang="en-CA" sz="1200" b="0" i="1" smtClean="0">
+                                  <a:latin typeface="Cambria Math" panose="02040503050406030204" pitchFamily="18" charset="0"/>
+                                </a:rPr>
+                              </m:ctrlPr>
+                            </m:dPr>
+                            <m:e>
+                              <m:r>
+                                <a:rPr lang="en-CA" sz="1200" b="0" i="1" smtClean="0">
+                                  <a:latin typeface="Cambria Math" panose="02040503050406030204" pitchFamily="18" charset="0"/>
+                                </a:rPr>
+                                <m:t>𝑁</m:t>
+                              </m:r>
+                              <m:r>
+                                <a:rPr lang="en-CA" sz="1200" b="0" i="1" smtClean="0">
+                                  <a:latin typeface="Cambria Math" panose="02040503050406030204" pitchFamily="18" charset="0"/>
+                                </a:rPr>
+                                <m:t>−1</m:t>
+                              </m:r>
+                            </m:e>
+                          </m:d>
+                          <m:r>
+                            <a:rPr lang="en-CA" sz="1200" b="0" i="1" smtClean="0">
+                              <a:latin typeface="Cambria Math" panose="02040503050406030204" pitchFamily="18" charset="0"/>
+                            </a:rPr>
+                            <m:t>𝑀</m:t>
+                          </m:r>
+                        </m:sub>
+                      </m:sSub>
+                    </m:oMath>
+                  </m:oMathPara>
+                </a14:m>
+                <a:endParaRPr lang="en-CA" sz="1200" b="0" dirty="0"/>
+              </a:p>
+            </p:txBody>
+          </p:sp>
+        </mc:Choice>
+        <mc:Fallback>
+          <p:sp>
+            <p:nvSpPr>
+              <p:cNvPr id="63" name="TextBox 62">
+                <a:extLst>
+                  <a:ext uri="{FF2B5EF4-FFF2-40B4-BE49-F238E27FC236}">
+                    <a16:creationId xmlns:a16="http://schemas.microsoft.com/office/drawing/2014/main" id="{BA19D60B-4A70-4CE0-BCCF-1DDBD79354D0}"/>
+                  </a:ext>
+                </a:extLst>
+              </p:cNvPr>
+              <p:cNvSpPr txBox="1">
+                <a:spLocks noRot="1" noChangeAspect="1" noMove="1" noResize="1" noEditPoints="1" noAdjustHandles="1" noChangeArrowheads="1" noChangeShapeType="1" noTextEdit="1"/>
+              </p:cNvSpPr>
+              <p:nvPr/>
+            </p:nvSpPr>
+            <p:spPr>
+              <a:xfrm>
+                <a:off x="5074284" y="5477228"/>
+                <a:ext cx="439766" cy="202491"/>
+              </a:xfrm>
+              <a:prstGeom prst="rect">
+                <a:avLst/>
+              </a:prstGeom>
+              <a:blipFill>
+                <a:blip r:embed="rId20"/>
+                <a:stretch>
+                  <a:fillRect l="-12329" r="-31507" b="-2941"/>
+                </a:stretch>
+              </a:blipFill>
+            </p:spPr>
+            <p:txBody>
+              <a:bodyPr/>
+              <a:lstStyle/>
+              <a:p>
+                <a:r>
+                  <a:rPr lang="en-CA">
+                    <a:noFill/>
+                  </a:rPr>
+                  <a:t> </a:t>
+                </a:r>
+              </a:p>
+            </p:txBody>
+          </p:sp>
+        </mc:Fallback>
+      </mc:AlternateContent>
+      <p:sp>
+        <p:nvSpPr>
+          <p:cNvPr id="64" name="TextBox 63">
+            <a:extLst>
+              <a:ext uri="{FF2B5EF4-FFF2-40B4-BE49-F238E27FC236}">
+                <a16:creationId xmlns:a16="http://schemas.microsoft.com/office/drawing/2014/main" id="{F91C725F-D4B9-43C1-A366-8E350522685F}"/>
+              </a:ext>
+            </a:extLst>
+          </p:cNvPr>
+          <p:cNvSpPr txBox="1"/>
+          <p:nvPr/>
+        </p:nvSpPr>
+        <p:spPr>
+          <a:xfrm>
+            <a:off x="5199527" y="1978847"/>
+            <a:ext cx="268124" cy="3416320"/>
+          </a:xfrm>
+          <a:prstGeom prst="rect">
+            <a:avLst/>
+          </a:prstGeom>
+          <a:noFill/>
+        </p:spPr>
+        <p:txBody>
+          <a:bodyPr wrap="square" rtlCol="0">
+            <a:spAutoFit/>
+          </a:bodyPr>
+          <a:lstStyle/>
+          <a:p>
+            <a:r>
+              <a:rPr lang="en-CA" dirty="0"/>
+              <a:t>.</a:t>
+            </a:r>
+          </a:p>
+          <a:p>
+            <a:r>
+              <a:rPr lang="en-CA" dirty="0"/>
+              <a:t>.</a:t>
+            </a:r>
+          </a:p>
+          <a:p>
+            <a:r>
+              <a:rPr lang="en-CA" dirty="0"/>
+              <a:t>.</a:t>
+            </a:r>
+          </a:p>
+          <a:p>
+            <a:r>
+              <a:rPr lang="en-CA" dirty="0"/>
+              <a:t>.</a:t>
+            </a:r>
+          </a:p>
+          <a:p>
+            <a:r>
+              <a:rPr lang="en-CA" dirty="0"/>
+              <a:t>.</a:t>
+            </a:r>
+          </a:p>
+          <a:p>
+            <a:r>
+              <a:rPr lang="en-CA" dirty="0"/>
+              <a:t>.</a:t>
+            </a:r>
+          </a:p>
+          <a:p>
+            <a:r>
+              <a:rPr lang="en-CA" dirty="0"/>
+              <a:t>.</a:t>
+            </a:r>
+          </a:p>
+          <a:p>
+            <a:r>
+              <a:rPr lang="en-CA" dirty="0"/>
+              <a:t>.</a:t>
+            </a:r>
+          </a:p>
+          <a:p>
+            <a:r>
+              <a:rPr lang="en-CA" dirty="0"/>
+              <a:t>.</a:t>
+            </a:r>
+          </a:p>
+          <a:p>
+            <a:r>
+              <a:rPr lang="en-CA" dirty="0"/>
+              <a:t>.</a:t>
+            </a:r>
+          </a:p>
+          <a:p>
+            <a:r>
+              <a:rPr lang="en-CA" dirty="0"/>
+              <a:t>.</a:t>
+            </a:r>
+          </a:p>
+          <a:p>
+            <a:r>
+              <a:rPr lang="en-CA" dirty="0"/>
+              <a:t>.</a:t>
+            </a:r>
+          </a:p>
+        </p:txBody>
+      </p:sp>
     </p:spTree>
     <p:extLst>
       <p:ext uri="{BB962C8B-B14F-4D97-AF65-F5344CB8AC3E}">
@@ -7124,6 +7487,156 @@
           </a:fontRef>
         </p:style>
       </p:cxnSp>
+      <p:pic>
+        <p:nvPicPr>
+          <p:cNvPr id="2" name="Picture 1">
+            <a:extLst>
+              <a:ext uri="{FF2B5EF4-FFF2-40B4-BE49-F238E27FC236}">
+                <a16:creationId xmlns:a16="http://schemas.microsoft.com/office/drawing/2014/main" id="{9BE34C83-96B6-42AE-A710-850BCA3F1166}"/>
+              </a:ext>
+            </a:extLst>
+          </p:cNvPr>
+          <p:cNvPicPr>
+            <a:picLocks noChangeAspect="1"/>
+          </p:cNvPicPr>
+          <p:nvPr/>
+        </p:nvPicPr>
+        <p:blipFill>
+          <a:blip r:embed="rId8"/>
+          <a:stretch>
+            <a:fillRect/>
+          </a:stretch>
+        </p:blipFill>
+        <p:spPr>
+          <a:xfrm>
+            <a:off x="4024393" y="1204735"/>
+            <a:ext cx="384840" cy="375023"/>
+          </a:xfrm>
+          <a:prstGeom prst="rect">
+            <a:avLst/>
+          </a:prstGeom>
+        </p:spPr>
+      </p:pic>
+      <p:pic>
+        <p:nvPicPr>
+          <p:cNvPr id="3" name="Picture 2">
+            <a:extLst>
+              <a:ext uri="{FF2B5EF4-FFF2-40B4-BE49-F238E27FC236}">
+                <a16:creationId xmlns:a16="http://schemas.microsoft.com/office/drawing/2014/main" id="{75DC2FE5-A555-432E-A25B-3E3DCCBB41F5}"/>
+              </a:ext>
+            </a:extLst>
+          </p:cNvPr>
+          <p:cNvPicPr>
+            <a:picLocks noChangeAspect="1"/>
+          </p:cNvPicPr>
+          <p:nvPr/>
+        </p:nvPicPr>
+        <p:blipFill>
+          <a:blip r:embed="rId9"/>
+          <a:stretch>
+            <a:fillRect/>
+          </a:stretch>
+        </p:blipFill>
+        <p:spPr>
+          <a:xfrm>
+            <a:off x="2539038" y="2531873"/>
+            <a:ext cx="325690" cy="312810"/>
+          </a:xfrm>
+          <a:prstGeom prst="rect">
+            <a:avLst/>
+          </a:prstGeom>
+        </p:spPr>
+      </p:pic>
+      <p:pic>
+        <p:nvPicPr>
+          <p:cNvPr id="4" name="Picture 3">
+            <a:extLst>
+              <a:ext uri="{FF2B5EF4-FFF2-40B4-BE49-F238E27FC236}">
+                <a16:creationId xmlns:a16="http://schemas.microsoft.com/office/drawing/2014/main" id="{D0527C6D-064E-40B2-9AB1-72D5722490F3}"/>
+              </a:ext>
+            </a:extLst>
+          </p:cNvPr>
+          <p:cNvPicPr>
+            <a:picLocks noChangeAspect="1"/>
+          </p:cNvPicPr>
+          <p:nvPr/>
+        </p:nvPicPr>
+        <p:blipFill>
+          <a:blip r:embed="rId10"/>
+          <a:stretch>
+            <a:fillRect/>
+          </a:stretch>
+        </p:blipFill>
+        <p:spPr>
+          <a:xfrm>
+            <a:off x="3281841" y="3316277"/>
+            <a:ext cx="350726" cy="312810"/>
+          </a:xfrm>
+          <a:prstGeom prst="rect">
+            <a:avLst/>
+          </a:prstGeom>
+        </p:spPr>
+      </p:pic>
+      <p:pic>
+        <p:nvPicPr>
+          <p:cNvPr id="5" name="Picture 4">
+            <a:extLst>
+              <a:ext uri="{FF2B5EF4-FFF2-40B4-BE49-F238E27FC236}">
+                <a16:creationId xmlns:a16="http://schemas.microsoft.com/office/drawing/2014/main" id="{79BB9554-C067-4ED8-9287-4D9301EEB968}"/>
+              </a:ext>
+            </a:extLst>
+          </p:cNvPr>
+          <p:cNvPicPr>
+            <a:picLocks noChangeAspect="1"/>
+          </p:cNvPicPr>
+          <p:nvPr/>
+        </p:nvPicPr>
+        <p:blipFill>
+          <a:blip r:embed="rId11"/>
+          <a:stretch>
+            <a:fillRect/>
+          </a:stretch>
+        </p:blipFill>
+        <p:spPr>
+          <a:xfrm>
+            <a:off x="5419051" y="3316277"/>
+            <a:ext cx="321939" cy="325771"/>
+          </a:xfrm>
+          <a:prstGeom prst="rect">
+            <a:avLst/>
+          </a:prstGeom>
+        </p:spPr>
+      </p:pic>
+      <p:pic>
+        <p:nvPicPr>
+          <p:cNvPr id="6" name="Picture 5">
+            <a:extLst>
+              <a:ext uri="{FF2B5EF4-FFF2-40B4-BE49-F238E27FC236}">
+                <a16:creationId xmlns:a16="http://schemas.microsoft.com/office/drawing/2014/main" id="{8DB27817-C521-4F5E-B312-80343C076CFF}"/>
+              </a:ext>
+            </a:extLst>
+          </p:cNvPr>
+          <p:cNvPicPr>
+            <a:picLocks noChangeAspect="1"/>
+          </p:cNvPicPr>
+          <p:nvPr/>
+        </p:nvPicPr>
+        <p:blipFill>
+          <a:blip r:embed="rId12"/>
+          <a:stretch>
+            <a:fillRect/>
+          </a:stretch>
+        </p:blipFill>
+        <p:spPr>
+          <a:xfrm>
+            <a:off x="6160157" y="2577979"/>
+            <a:ext cx="365257" cy="312810"/>
+          </a:xfrm>
+          <a:prstGeom prst="rect">
+            <a:avLst/>
+          </a:prstGeom>
+        </p:spPr>
+      </p:pic>
     </p:spTree>
     <p:extLst>
       <p:ext uri="{BB962C8B-B14F-4D97-AF65-F5344CB8AC3E}">
@@ -7298,6 +7811,449 @@
     <p:extLst>
       <p:ext uri="{BB962C8B-B14F-4D97-AF65-F5344CB8AC3E}">
         <p14:creationId xmlns:p14="http://schemas.microsoft.com/office/powerpoint/2010/main" val="111145971"/>
+      </p:ext>
+    </p:extLst>
+  </p:cSld>
+  <p:clrMapOvr>
+    <a:masterClrMapping/>
+  </p:clrMapOvr>
+</p:sld>
+</file>
+
+<file path=ppt/slides/slide4.xml><?xml version="1.0" encoding="utf-8"?>
+<p:sld xmlns:a="http://schemas.openxmlformats.org/drawingml/2006/main" xmlns:r="http://schemas.openxmlformats.org/officeDocument/2006/relationships" xmlns:p="http://schemas.openxmlformats.org/presentationml/2006/main">
+  <p:cSld>
+    <p:spTree>
+      <p:nvGrpSpPr>
+        <p:cNvPr id="1" name=""/>
+        <p:cNvGrpSpPr/>
+        <p:nvPr/>
+      </p:nvGrpSpPr>
+      <p:grpSpPr>
+        <a:xfrm>
+          <a:off x="0" y="0"/>
+          <a:ext cx="0" cy="0"/>
+          <a:chOff x="0" y="0"/>
+          <a:chExt cx="0" cy="0"/>
+        </a:xfrm>
+      </p:grpSpPr>
+      <p:pic>
+        <p:nvPicPr>
+          <p:cNvPr id="10" name="Picture 9" descr="A picture containing photo, monitor, different, table&#10;&#10;Description automatically generated">
+            <a:extLst>
+              <a:ext uri="{FF2B5EF4-FFF2-40B4-BE49-F238E27FC236}">
+                <a16:creationId xmlns:a16="http://schemas.microsoft.com/office/drawing/2014/main" id="{DA797AFF-8B36-412D-8052-D9368404AB16}"/>
+              </a:ext>
+            </a:extLst>
+          </p:cNvPr>
+          <p:cNvPicPr>
+            <a:picLocks noChangeAspect="1"/>
+          </p:cNvPicPr>
+          <p:nvPr/>
+        </p:nvPicPr>
+        <p:blipFill>
+          <a:blip r:embed="rId2">
+            <a:extLst>
+              <a:ext uri="{28A0092B-C50C-407E-A947-70E740481C1C}">
+                <a14:useLocalDpi xmlns:a14="http://schemas.microsoft.com/office/drawing/2010/main" val="0"/>
+              </a:ext>
+            </a:extLst>
+          </a:blip>
+          <a:stretch>
+            <a:fillRect/>
+          </a:stretch>
+        </p:blipFill>
+        <p:spPr>
+          <a:xfrm>
+            <a:off x="2488812" y="0"/>
+            <a:ext cx="7068845" cy="6858000"/>
+          </a:xfrm>
+          <a:prstGeom prst="rect">
+            <a:avLst/>
+          </a:prstGeom>
+        </p:spPr>
+      </p:pic>
+      <p:sp>
+        <p:nvSpPr>
+          <p:cNvPr id="11" name="TextBox 10">
+            <a:extLst>
+              <a:ext uri="{FF2B5EF4-FFF2-40B4-BE49-F238E27FC236}">
+                <a16:creationId xmlns:a16="http://schemas.microsoft.com/office/drawing/2014/main" id="{E5300CD5-C026-4E68-AD78-9AE55F1C8C38}"/>
+              </a:ext>
+            </a:extLst>
+          </p:cNvPr>
+          <p:cNvSpPr txBox="1"/>
+          <p:nvPr/>
+        </p:nvSpPr>
+        <p:spPr>
+          <a:xfrm>
+            <a:off x="2634343" y="269186"/>
+            <a:ext cx="404949" cy="369332"/>
+          </a:xfrm>
+          <a:prstGeom prst="rect">
+            <a:avLst/>
+          </a:prstGeom>
+          <a:noFill/>
+        </p:spPr>
+        <p:txBody>
+          <a:bodyPr wrap="square" rtlCol="0">
+            <a:spAutoFit/>
+          </a:bodyPr>
+          <a:lstStyle/>
+          <a:p>
+            <a:r>
+              <a:rPr lang="en-CA" dirty="0"/>
+              <a:t>a)</a:t>
+            </a:r>
+          </a:p>
+        </p:txBody>
+      </p:sp>
+      <p:sp>
+        <p:nvSpPr>
+          <p:cNvPr id="12" name="TextBox 11">
+            <a:extLst>
+              <a:ext uri="{FF2B5EF4-FFF2-40B4-BE49-F238E27FC236}">
+                <a16:creationId xmlns:a16="http://schemas.microsoft.com/office/drawing/2014/main" id="{84A6F6DF-3A11-4506-B5EC-838FB847722A}"/>
+              </a:ext>
+            </a:extLst>
+          </p:cNvPr>
+          <p:cNvSpPr txBox="1"/>
+          <p:nvPr/>
+        </p:nvSpPr>
+        <p:spPr>
+          <a:xfrm>
+            <a:off x="2634343" y="3378927"/>
+            <a:ext cx="404949" cy="369332"/>
+          </a:xfrm>
+          <a:prstGeom prst="rect">
+            <a:avLst/>
+          </a:prstGeom>
+          <a:noFill/>
+        </p:spPr>
+        <p:txBody>
+          <a:bodyPr wrap="square" rtlCol="0">
+            <a:spAutoFit/>
+          </a:bodyPr>
+          <a:lstStyle/>
+          <a:p>
+            <a:r>
+              <a:rPr lang="en-CA" dirty="0"/>
+              <a:t>b)</a:t>
+            </a:r>
+          </a:p>
+        </p:txBody>
+      </p:sp>
+    </p:spTree>
+    <p:extLst>
+      <p:ext uri="{BB962C8B-B14F-4D97-AF65-F5344CB8AC3E}">
+        <p14:creationId xmlns:p14="http://schemas.microsoft.com/office/powerpoint/2010/main" val="3533233609"/>
+      </p:ext>
+    </p:extLst>
+  </p:cSld>
+  <p:clrMapOvr>
+    <a:masterClrMapping/>
+  </p:clrMapOvr>
+</p:sld>
+</file>
+
+<file path=ppt/slides/slide5.xml><?xml version="1.0" encoding="utf-8"?>
+<p:sld xmlns:a="http://schemas.openxmlformats.org/drawingml/2006/main" xmlns:r="http://schemas.openxmlformats.org/officeDocument/2006/relationships" xmlns:p="http://schemas.openxmlformats.org/presentationml/2006/main">
+  <p:cSld>
+    <p:spTree>
+      <p:nvGrpSpPr>
+        <p:cNvPr id="1" name=""/>
+        <p:cNvGrpSpPr/>
+        <p:nvPr/>
+      </p:nvGrpSpPr>
+      <p:grpSpPr>
+        <a:xfrm>
+          <a:off x="0" y="0"/>
+          <a:ext cx="0" cy="0"/>
+          <a:chOff x="0" y="0"/>
+          <a:chExt cx="0" cy="0"/>
+        </a:xfrm>
+      </p:grpSpPr>
+      <p:sp>
+        <p:nvSpPr>
+          <p:cNvPr id="11" name="TextBox 10">
+            <a:extLst>
+              <a:ext uri="{FF2B5EF4-FFF2-40B4-BE49-F238E27FC236}">
+                <a16:creationId xmlns:a16="http://schemas.microsoft.com/office/drawing/2014/main" id="{E5300CD5-C026-4E68-AD78-9AE55F1C8C38}"/>
+              </a:ext>
+            </a:extLst>
+          </p:cNvPr>
+          <p:cNvSpPr txBox="1"/>
+          <p:nvPr/>
+        </p:nvSpPr>
+        <p:spPr>
+          <a:xfrm>
+            <a:off x="2634343" y="269186"/>
+            <a:ext cx="404949" cy="369332"/>
+          </a:xfrm>
+          <a:prstGeom prst="rect">
+            <a:avLst/>
+          </a:prstGeom>
+          <a:noFill/>
+        </p:spPr>
+        <p:txBody>
+          <a:bodyPr wrap="square" rtlCol="0">
+            <a:spAutoFit/>
+          </a:bodyPr>
+          <a:lstStyle/>
+          <a:p>
+            <a:r>
+              <a:rPr lang="en-CA" dirty="0"/>
+              <a:t>a)</a:t>
+            </a:r>
+          </a:p>
+        </p:txBody>
+      </p:sp>
+      <p:sp>
+        <p:nvSpPr>
+          <p:cNvPr id="12" name="TextBox 11">
+            <a:extLst>
+              <a:ext uri="{FF2B5EF4-FFF2-40B4-BE49-F238E27FC236}">
+                <a16:creationId xmlns:a16="http://schemas.microsoft.com/office/drawing/2014/main" id="{84A6F6DF-3A11-4506-B5EC-838FB847722A}"/>
+              </a:ext>
+            </a:extLst>
+          </p:cNvPr>
+          <p:cNvSpPr txBox="1"/>
+          <p:nvPr/>
+        </p:nvSpPr>
+        <p:spPr>
+          <a:xfrm>
+            <a:off x="2634343" y="3378927"/>
+            <a:ext cx="404949" cy="369332"/>
+          </a:xfrm>
+          <a:prstGeom prst="rect">
+            <a:avLst/>
+          </a:prstGeom>
+          <a:noFill/>
+        </p:spPr>
+        <p:txBody>
+          <a:bodyPr wrap="square" rtlCol="0">
+            <a:spAutoFit/>
+          </a:bodyPr>
+          <a:lstStyle/>
+          <a:p>
+            <a:r>
+              <a:rPr lang="en-CA" dirty="0"/>
+              <a:t>b)</a:t>
+            </a:r>
+          </a:p>
+        </p:txBody>
+      </p:sp>
+      <p:pic>
+        <p:nvPicPr>
+          <p:cNvPr id="3" name="Picture 2" descr="A picture containing screenshot&#10;&#10;Description automatically generated">
+            <a:extLst>
+              <a:ext uri="{FF2B5EF4-FFF2-40B4-BE49-F238E27FC236}">
+                <a16:creationId xmlns:a16="http://schemas.microsoft.com/office/drawing/2014/main" id="{249D4B9F-BF16-4A49-9153-226A3AE537A4}"/>
+              </a:ext>
+            </a:extLst>
+          </p:cNvPr>
+          <p:cNvPicPr>
+            <a:picLocks noChangeAspect="1"/>
+          </p:cNvPicPr>
+          <p:nvPr/>
+        </p:nvPicPr>
+        <p:blipFill>
+          <a:blip r:embed="rId2">
+            <a:extLst>
+              <a:ext uri="{28A0092B-C50C-407E-A947-70E740481C1C}">
+                <a14:useLocalDpi xmlns:a14="http://schemas.microsoft.com/office/drawing/2010/main" val="0"/>
+              </a:ext>
+            </a:extLst>
+          </a:blip>
+          <a:stretch>
+            <a:fillRect/>
+          </a:stretch>
+        </p:blipFill>
+        <p:spPr>
+          <a:xfrm>
+            <a:off x="2634343" y="55495"/>
+            <a:ext cx="6470009" cy="6858000"/>
+          </a:xfrm>
+          <a:prstGeom prst="rect">
+            <a:avLst/>
+          </a:prstGeom>
+        </p:spPr>
+      </p:pic>
+    </p:spTree>
+    <p:extLst>
+      <p:ext uri="{BB962C8B-B14F-4D97-AF65-F5344CB8AC3E}">
+        <p14:creationId xmlns:p14="http://schemas.microsoft.com/office/powerpoint/2010/main" val="3883262812"/>
+      </p:ext>
+    </p:extLst>
+  </p:cSld>
+  <p:clrMapOvr>
+    <a:masterClrMapping/>
+  </p:clrMapOvr>
+</p:sld>
+</file>
+
+<file path=ppt/slides/slide6.xml><?xml version="1.0" encoding="utf-8"?>
+<p:sld xmlns:a="http://schemas.openxmlformats.org/drawingml/2006/main" xmlns:r="http://schemas.openxmlformats.org/officeDocument/2006/relationships" xmlns:p="http://schemas.openxmlformats.org/presentationml/2006/main">
+  <p:cSld>
+    <p:spTree>
+      <p:nvGrpSpPr>
+        <p:cNvPr id="1" name=""/>
+        <p:cNvGrpSpPr/>
+        <p:nvPr/>
+      </p:nvGrpSpPr>
+      <p:grpSpPr>
+        <a:xfrm>
+          <a:off x="0" y="0"/>
+          <a:ext cx="0" cy="0"/>
+          <a:chOff x="0" y="0"/>
+          <a:chExt cx="0" cy="0"/>
+        </a:xfrm>
+      </p:grpSpPr>
+      <p:sp>
+        <p:nvSpPr>
+          <p:cNvPr id="11" name="TextBox 10">
+            <a:extLst>
+              <a:ext uri="{FF2B5EF4-FFF2-40B4-BE49-F238E27FC236}">
+                <a16:creationId xmlns:a16="http://schemas.microsoft.com/office/drawing/2014/main" id="{E5300CD5-C026-4E68-AD78-9AE55F1C8C38}"/>
+              </a:ext>
+            </a:extLst>
+          </p:cNvPr>
+          <p:cNvSpPr txBox="1"/>
+          <p:nvPr/>
+        </p:nvSpPr>
+        <p:spPr>
+          <a:xfrm>
+            <a:off x="2634343" y="269186"/>
+            <a:ext cx="404949" cy="369332"/>
+          </a:xfrm>
+          <a:prstGeom prst="rect">
+            <a:avLst/>
+          </a:prstGeom>
+          <a:noFill/>
+        </p:spPr>
+        <p:txBody>
+          <a:bodyPr wrap="square" rtlCol="0">
+            <a:spAutoFit/>
+          </a:bodyPr>
+          <a:lstStyle/>
+          <a:p>
+            <a:r>
+              <a:rPr lang="en-CA" dirty="0"/>
+              <a:t>a)</a:t>
+            </a:r>
+          </a:p>
+        </p:txBody>
+      </p:sp>
+      <p:sp>
+        <p:nvSpPr>
+          <p:cNvPr id="12" name="TextBox 11">
+            <a:extLst>
+              <a:ext uri="{FF2B5EF4-FFF2-40B4-BE49-F238E27FC236}">
+                <a16:creationId xmlns:a16="http://schemas.microsoft.com/office/drawing/2014/main" id="{84A6F6DF-3A11-4506-B5EC-838FB847722A}"/>
+              </a:ext>
+            </a:extLst>
+          </p:cNvPr>
+          <p:cNvSpPr txBox="1"/>
+          <p:nvPr/>
+        </p:nvSpPr>
+        <p:spPr>
+          <a:xfrm>
+            <a:off x="2634342" y="2161383"/>
+            <a:ext cx="404949" cy="369332"/>
+          </a:xfrm>
+          <a:prstGeom prst="rect">
+            <a:avLst/>
+          </a:prstGeom>
+          <a:noFill/>
+        </p:spPr>
+        <p:txBody>
+          <a:bodyPr wrap="square" rtlCol="0">
+            <a:spAutoFit/>
+          </a:bodyPr>
+          <a:lstStyle/>
+          <a:p>
+            <a:r>
+              <a:rPr lang="en-CA" dirty="0"/>
+              <a:t>b)</a:t>
+            </a:r>
+          </a:p>
+        </p:txBody>
+      </p:sp>
+      <p:sp>
+        <p:nvSpPr>
+          <p:cNvPr id="9" name="TextBox 8">
+            <a:extLst>
+              <a:ext uri="{FF2B5EF4-FFF2-40B4-BE49-F238E27FC236}">
+                <a16:creationId xmlns:a16="http://schemas.microsoft.com/office/drawing/2014/main" id="{8D6F6324-71D1-4ADD-AD34-7B1264DFC4B4}"/>
+              </a:ext>
+            </a:extLst>
+          </p:cNvPr>
+          <p:cNvSpPr txBox="1"/>
+          <p:nvPr/>
+        </p:nvSpPr>
+        <p:spPr>
+          <a:xfrm>
+            <a:off x="2634342" y="4472645"/>
+            <a:ext cx="404949" cy="369332"/>
+          </a:xfrm>
+          <a:prstGeom prst="rect">
+            <a:avLst/>
+          </a:prstGeom>
+          <a:noFill/>
+        </p:spPr>
+        <p:txBody>
+          <a:bodyPr wrap="square" rtlCol="0">
+            <a:spAutoFit/>
+          </a:bodyPr>
+          <a:lstStyle/>
+          <a:p>
+            <a:r>
+              <a:rPr lang="en-CA" dirty="0"/>
+              <a:t>c)</a:t>
+            </a:r>
+          </a:p>
+        </p:txBody>
+      </p:sp>
+      <p:pic>
+        <p:nvPicPr>
+          <p:cNvPr id="6" name="Picture 5" descr="A picture containing screenshot&#10;&#10;Description automatically generated">
+            <a:extLst>
+              <a:ext uri="{FF2B5EF4-FFF2-40B4-BE49-F238E27FC236}">
+                <a16:creationId xmlns:a16="http://schemas.microsoft.com/office/drawing/2014/main" id="{A5A888EC-B30F-4FE1-BB92-B93167477F33}"/>
+              </a:ext>
+            </a:extLst>
+          </p:cNvPr>
+          <p:cNvPicPr>
+            <a:picLocks noChangeAspect="1"/>
+          </p:cNvPicPr>
+          <p:nvPr/>
+        </p:nvPicPr>
+        <p:blipFill>
+          <a:blip r:embed="rId2">
+            <a:extLst>
+              <a:ext uri="{28A0092B-C50C-407E-A947-70E740481C1C}">
+                <a14:useLocalDpi xmlns:a14="http://schemas.microsoft.com/office/drawing/2010/main" val="0"/>
+              </a:ext>
+            </a:extLst>
+          </a:blip>
+          <a:stretch>
+            <a:fillRect/>
+          </a:stretch>
+        </p:blipFill>
+        <p:spPr>
+          <a:xfrm>
+            <a:off x="2589044" y="40209"/>
+            <a:ext cx="6968613" cy="6858000"/>
+          </a:xfrm>
+          <a:prstGeom prst="rect">
+            <a:avLst/>
+          </a:prstGeom>
+        </p:spPr>
+      </p:pic>
+    </p:spTree>
+    <p:extLst>
+      <p:ext uri="{BB962C8B-B14F-4D97-AF65-F5344CB8AC3E}">
+        <p14:creationId xmlns:p14="http://schemas.microsoft.com/office/powerpoint/2010/main" val="2097384629"/>
       </p:ext>
     </p:extLst>
   </p:cSld>

</xml_diff>